<commit_message>
Updated bm & slides for new bug
</commit_message>
<xml_diff>
--- a/presentations/PM Review.pptx
+++ b/presentations/PM Review.pptx
@@ -35276,8 +35276,8 @@
         </p:nvSpPr>
         <p:spPr>
           <a:xfrm>
-            <a:off x="-1" y="50877"/>
-            <a:ext cx="9144000" cy="663111"/>
+            <a:off x="0" y="116014"/>
+            <a:ext cx="4161296" cy="663111"/>
           </a:xfrm>
           <a:prstGeom prst="rect">
             <a:avLst/>
@@ -35562,14 +35562,14 @@
           <p:nvPr>
             <p:extLst>
               <p:ext uri="{D42A27DB-BD31-4B8C-83A1-F6EECF244321}">
-                <p14:modId xmlns:p14="http://schemas.microsoft.com/office/powerpoint/2010/main" val="2160490552"/>
+                <p14:modId xmlns:p14="http://schemas.microsoft.com/office/powerpoint/2010/main" val="1310835118"/>
               </p:ext>
             </p:extLst>
           </p:nvPr>
         </p:nvGraphicFramePr>
         <p:xfrm>
           <a:off x="190447" y="974537"/>
-          <a:ext cx="8763105" cy="3476329"/>
+          <a:ext cx="8763105" cy="4009418"/>
         </p:xfrm>
         <a:graphic>
           <a:graphicData uri="http://schemas.openxmlformats.org/drawingml/2006/table">
@@ -35985,10 +35985,367 @@
                   </a:ext>
                 </a:extLst>
               </a:tr>
+              <a:tr h="533089">
+                <a:tc>
+                  <a:txBody>
+                    <a:bodyPr/>
+                    <a:lstStyle/>
+                    <a:p>
+                      <a:pPr algn="ctr"/>
+                      <a:r>
+                        <a:rPr lang="en-SG" sz="1500" b="1" dirty="0"/>
+                        <a:t>6</a:t>
+                      </a:r>
+                    </a:p>
+                  </a:txBody>
+                  <a:tcPr marL="131446" marR="131446" marT="65724" marB="65724"/>
+                </a:tc>
+                <a:tc>
+                  <a:txBody>
+                    <a:bodyPr/>
+                    <a:lstStyle/>
+                    <a:p>
+                      <a:pPr algn="ctr"/>
+                      <a:r>
+                        <a:rPr lang="en-SG" sz="1500" b="1" dirty="0"/>
+                        <a:t>Bootstrap – does not work on AWS</a:t>
+                      </a:r>
+                    </a:p>
+                  </a:txBody>
+                  <a:tcPr marL="131446" marR="131446" marT="65724" marB="65724"/>
+                </a:tc>
+                <a:tc>
+                  <a:txBody>
+                    <a:bodyPr/>
+                    <a:lstStyle/>
+                    <a:p>
+                      <a:pPr algn="ctr"/>
+                      <a:r>
+                        <a:rPr lang="en-SG" sz="1500" b="1" dirty="0"/>
+                        <a:t>10 - Critical</a:t>
+                      </a:r>
+                    </a:p>
+                  </a:txBody>
+                  <a:tcPr marL="131446" marR="131446" marT="65724" marB="65724"/>
+                </a:tc>
+                <a:tc>
+                  <a:txBody>
+                    <a:bodyPr/>
+                    <a:lstStyle/>
+                    <a:p>
+                      <a:pPr algn="ctr"/>
+                      <a:r>
+                        <a:rPr lang="en-SG" sz="1500" b="1" dirty="0"/>
+                        <a:t>Unresolved</a:t>
+                      </a:r>
+                    </a:p>
+                  </a:txBody>
+                  <a:tcPr marL="131446" marR="131446" marT="65724" marB="65724"/>
+                </a:tc>
+                <a:extLst>
+                  <a:ext uri="{0D108BD9-81ED-4DB2-BD59-A6C34878D82A}">
+                    <a16:rowId xmlns:a16="http://schemas.microsoft.com/office/drawing/2014/main" val="475673856"/>
+                  </a:ext>
+                </a:extLst>
+              </a:tr>
             </a:tbl>
           </a:graphicData>
         </a:graphic>
       </p:graphicFrame>
+      <p:sp>
+        <p:nvSpPr>
+          <p:cNvPr id="5" name="Google Shape;265;p29">
+            <a:extLst>
+              <a:ext uri="{FF2B5EF4-FFF2-40B4-BE49-F238E27FC236}">
+                <a16:creationId xmlns:a16="http://schemas.microsoft.com/office/drawing/2014/main" id="{72AE9D60-0DA9-4EFE-B934-E459AFF4E21D}"/>
+              </a:ext>
+            </a:extLst>
+          </p:cNvPr>
+          <p:cNvSpPr txBox="1">
+            <a:spLocks/>
+          </p:cNvSpPr>
+          <p:nvPr/>
+        </p:nvSpPr>
+        <p:spPr>
+          <a:xfrm>
+            <a:off x="6416040" y="50877"/>
+            <a:ext cx="2727960" cy="793386"/>
+          </a:xfrm>
+          <a:prstGeom prst="rect">
+            <a:avLst/>
+          </a:prstGeom>
+          <a:noFill/>
+          <a:ln>
+            <a:noFill/>
+          </a:ln>
+        </p:spPr>
+        <p:txBody>
+          <a:bodyPr spcFirstLastPara="1" wrap="square" lIns="0" tIns="0" rIns="0" bIns="0" anchor="b" anchorCtr="0">
+            <a:noAutofit/>
+          </a:bodyPr>
+          <a:lstStyle>
+            <a:defPPr marR="0" lvl="0" algn="l" rtl="0">
+              <a:lnSpc>
+                <a:spcPct val="100000"/>
+              </a:lnSpc>
+              <a:spcBef>
+                <a:spcPts val="0"/>
+              </a:spcBef>
+              <a:spcAft>
+                <a:spcPts val="0"/>
+              </a:spcAft>
+            </a:defPPr>
+            <a:lvl1pPr marR="0" lvl="0" algn="l" rtl="0">
+              <a:lnSpc>
+                <a:spcPct val="100000"/>
+              </a:lnSpc>
+              <a:spcBef>
+                <a:spcPts val="0"/>
+              </a:spcBef>
+              <a:spcAft>
+                <a:spcPts val="0"/>
+              </a:spcAft>
+              <a:buClr>
+                <a:schemeClr val="lt1"/>
+              </a:buClr>
+              <a:buSzPts val="3200"/>
+              <a:buFont typeface="Lexend Deca"/>
+              <a:buNone/>
+              <a:defRPr sz="3200" b="1" i="0" u="none" strike="noStrike" cap="none">
+                <a:solidFill>
+                  <a:schemeClr val="lt1"/>
+                </a:solidFill>
+                <a:latin typeface="Lexend Deca"/>
+                <a:ea typeface="Lexend Deca"/>
+                <a:cs typeface="Lexend Deca"/>
+                <a:sym typeface="Lexend Deca"/>
+              </a:defRPr>
+            </a:lvl1pPr>
+            <a:lvl2pPr marR="0" lvl="1" algn="l" rtl="0">
+              <a:lnSpc>
+                <a:spcPct val="100000"/>
+              </a:lnSpc>
+              <a:spcBef>
+                <a:spcPts val="0"/>
+              </a:spcBef>
+              <a:spcAft>
+                <a:spcPts val="0"/>
+              </a:spcAft>
+              <a:buClr>
+                <a:schemeClr val="lt1"/>
+              </a:buClr>
+              <a:buSzPts val="3200"/>
+              <a:buFont typeface="Lexend Deca"/>
+              <a:buNone/>
+              <a:defRPr sz="3200" b="1" i="0" u="none" strike="noStrike" cap="none">
+                <a:solidFill>
+                  <a:schemeClr val="lt1"/>
+                </a:solidFill>
+                <a:latin typeface="Lexend Deca"/>
+                <a:ea typeface="Lexend Deca"/>
+                <a:cs typeface="Lexend Deca"/>
+                <a:sym typeface="Lexend Deca"/>
+              </a:defRPr>
+            </a:lvl2pPr>
+            <a:lvl3pPr marR="0" lvl="2" algn="l" rtl="0">
+              <a:lnSpc>
+                <a:spcPct val="100000"/>
+              </a:lnSpc>
+              <a:spcBef>
+                <a:spcPts val="0"/>
+              </a:spcBef>
+              <a:spcAft>
+                <a:spcPts val="0"/>
+              </a:spcAft>
+              <a:buClr>
+                <a:schemeClr val="lt1"/>
+              </a:buClr>
+              <a:buSzPts val="3200"/>
+              <a:buFont typeface="Lexend Deca"/>
+              <a:buNone/>
+              <a:defRPr sz="3200" b="1" i="0" u="none" strike="noStrike" cap="none">
+                <a:solidFill>
+                  <a:schemeClr val="lt1"/>
+                </a:solidFill>
+                <a:latin typeface="Lexend Deca"/>
+                <a:ea typeface="Lexend Deca"/>
+                <a:cs typeface="Lexend Deca"/>
+                <a:sym typeface="Lexend Deca"/>
+              </a:defRPr>
+            </a:lvl3pPr>
+            <a:lvl4pPr marR="0" lvl="3" algn="l" rtl="0">
+              <a:lnSpc>
+                <a:spcPct val="100000"/>
+              </a:lnSpc>
+              <a:spcBef>
+                <a:spcPts val="0"/>
+              </a:spcBef>
+              <a:spcAft>
+                <a:spcPts val="0"/>
+              </a:spcAft>
+              <a:buClr>
+                <a:schemeClr val="lt1"/>
+              </a:buClr>
+              <a:buSzPts val="3200"/>
+              <a:buFont typeface="Lexend Deca"/>
+              <a:buNone/>
+              <a:defRPr sz="3200" b="1" i="0" u="none" strike="noStrike" cap="none">
+                <a:solidFill>
+                  <a:schemeClr val="lt1"/>
+                </a:solidFill>
+                <a:latin typeface="Lexend Deca"/>
+                <a:ea typeface="Lexend Deca"/>
+                <a:cs typeface="Lexend Deca"/>
+                <a:sym typeface="Lexend Deca"/>
+              </a:defRPr>
+            </a:lvl4pPr>
+            <a:lvl5pPr marR="0" lvl="4" algn="l" rtl="0">
+              <a:lnSpc>
+                <a:spcPct val="100000"/>
+              </a:lnSpc>
+              <a:spcBef>
+                <a:spcPts val="0"/>
+              </a:spcBef>
+              <a:spcAft>
+                <a:spcPts val="0"/>
+              </a:spcAft>
+              <a:buClr>
+                <a:schemeClr val="lt1"/>
+              </a:buClr>
+              <a:buSzPts val="3200"/>
+              <a:buFont typeface="Lexend Deca"/>
+              <a:buNone/>
+              <a:defRPr sz="3200" b="1" i="0" u="none" strike="noStrike" cap="none">
+                <a:solidFill>
+                  <a:schemeClr val="lt1"/>
+                </a:solidFill>
+                <a:latin typeface="Lexend Deca"/>
+                <a:ea typeface="Lexend Deca"/>
+                <a:cs typeface="Lexend Deca"/>
+                <a:sym typeface="Lexend Deca"/>
+              </a:defRPr>
+            </a:lvl5pPr>
+            <a:lvl6pPr marR="0" lvl="5" algn="l" rtl="0">
+              <a:lnSpc>
+                <a:spcPct val="100000"/>
+              </a:lnSpc>
+              <a:spcBef>
+                <a:spcPts val="0"/>
+              </a:spcBef>
+              <a:spcAft>
+                <a:spcPts val="0"/>
+              </a:spcAft>
+              <a:buClr>
+                <a:schemeClr val="lt1"/>
+              </a:buClr>
+              <a:buSzPts val="3200"/>
+              <a:buFont typeface="Lexend Deca"/>
+              <a:buNone/>
+              <a:defRPr sz="3200" b="1" i="0" u="none" strike="noStrike" cap="none">
+                <a:solidFill>
+                  <a:schemeClr val="lt1"/>
+                </a:solidFill>
+                <a:latin typeface="Lexend Deca"/>
+                <a:ea typeface="Lexend Deca"/>
+                <a:cs typeface="Lexend Deca"/>
+                <a:sym typeface="Lexend Deca"/>
+              </a:defRPr>
+            </a:lvl6pPr>
+            <a:lvl7pPr marR="0" lvl="6" algn="l" rtl="0">
+              <a:lnSpc>
+                <a:spcPct val="100000"/>
+              </a:lnSpc>
+              <a:spcBef>
+                <a:spcPts val="0"/>
+              </a:spcBef>
+              <a:spcAft>
+                <a:spcPts val="0"/>
+              </a:spcAft>
+              <a:buClr>
+                <a:schemeClr val="lt1"/>
+              </a:buClr>
+              <a:buSzPts val="3200"/>
+              <a:buFont typeface="Lexend Deca"/>
+              <a:buNone/>
+              <a:defRPr sz="3200" b="1" i="0" u="none" strike="noStrike" cap="none">
+                <a:solidFill>
+                  <a:schemeClr val="lt1"/>
+                </a:solidFill>
+                <a:latin typeface="Lexend Deca"/>
+                <a:ea typeface="Lexend Deca"/>
+                <a:cs typeface="Lexend Deca"/>
+                <a:sym typeface="Lexend Deca"/>
+              </a:defRPr>
+            </a:lvl7pPr>
+            <a:lvl8pPr marR="0" lvl="7" algn="l" rtl="0">
+              <a:lnSpc>
+                <a:spcPct val="100000"/>
+              </a:lnSpc>
+              <a:spcBef>
+                <a:spcPts val="0"/>
+              </a:spcBef>
+              <a:spcAft>
+                <a:spcPts val="0"/>
+              </a:spcAft>
+              <a:buClr>
+                <a:schemeClr val="lt1"/>
+              </a:buClr>
+              <a:buSzPts val="3200"/>
+              <a:buFont typeface="Lexend Deca"/>
+              <a:buNone/>
+              <a:defRPr sz="3200" b="1" i="0" u="none" strike="noStrike" cap="none">
+                <a:solidFill>
+                  <a:schemeClr val="lt1"/>
+                </a:solidFill>
+                <a:latin typeface="Lexend Deca"/>
+                <a:ea typeface="Lexend Deca"/>
+                <a:cs typeface="Lexend Deca"/>
+                <a:sym typeface="Lexend Deca"/>
+              </a:defRPr>
+            </a:lvl8pPr>
+            <a:lvl9pPr marR="0" lvl="8" algn="l" rtl="0">
+              <a:lnSpc>
+                <a:spcPct val="100000"/>
+              </a:lnSpc>
+              <a:spcBef>
+                <a:spcPts val="0"/>
+              </a:spcBef>
+              <a:spcAft>
+                <a:spcPts val="0"/>
+              </a:spcAft>
+              <a:buClr>
+                <a:schemeClr val="lt1"/>
+              </a:buClr>
+              <a:buSzPts val="3200"/>
+              <a:buFont typeface="Lexend Deca"/>
+              <a:buNone/>
+              <a:defRPr sz="3200" b="1" i="0" u="none" strike="noStrike" cap="none">
+                <a:solidFill>
+                  <a:schemeClr val="lt1"/>
+                </a:solidFill>
+                <a:latin typeface="Lexend Deca"/>
+                <a:ea typeface="Lexend Deca"/>
+                <a:cs typeface="Lexend Deca"/>
+                <a:sym typeface="Lexend Deca"/>
+              </a:defRPr>
+            </a:lvl9pPr>
+          </a:lstStyle>
+          <a:p>
+            <a:r>
+              <a:rPr lang="en-SG" sz="4800" dirty="0"/>
+              <a:t>Total: </a:t>
+            </a:r>
+            <a:r>
+              <a:rPr lang="en-SG" sz="4800" u="sng" dirty="0"/>
+              <a:t>27</a:t>
+            </a:r>
+            <a:r>
+              <a:rPr lang="en-SG" sz="4800" dirty="0"/>
+              <a:t> </a:t>
+            </a:r>
+          </a:p>
+        </p:txBody>
+      </p:sp>
     </p:spTree>
     <p:extLst>
       <p:ext uri="{BB962C8B-B14F-4D97-AF65-F5344CB8AC3E}">

</xml_diff>

<commit_message>
Minor edits for PM Review Slides
</commit_message>
<xml_diff>
--- a/presentations/PM Review.pptx
+++ b/presentations/PM Review.pptx
@@ -18099,7 +18099,7 @@
                 <a:cs typeface="Muli Light"/>
                 <a:sym typeface="Muli Light"/>
               </a:rPr>
-              <a:t>3/10</a:t>
+              <a:t>4/10</a:t>
             </a:r>
             <a:endParaRPr sz="900" b="1" dirty="0">
               <a:solidFill>
@@ -18135,61 +18135,6 @@
           </a:prstGeom>
           <a:solidFill>
             <a:srgbClr val="1C4587"/>
-          </a:solidFill>
-          <a:ln w="9525" cap="flat" cmpd="sng">
-            <a:solidFill>
-              <a:srgbClr val="FFFFFF"/>
-            </a:solidFill>
-            <a:prstDash val="solid"/>
-            <a:round/>
-            <a:headEnd type="none" w="sm" len="sm"/>
-            <a:tailEnd type="none" w="sm" len="sm"/>
-          </a:ln>
-        </p:spPr>
-        <p:txBody>
-          <a:bodyPr spcFirstLastPara="1" wrap="square" lIns="91425" tIns="91425" rIns="91425" bIns="91425" anchor="ctr" anchorCtr="0">
-            <a:noAutofit/>
-          </a:bodyPr>
-          <a:lstStyle/>
-          <a:p>
-            <a:pPr lvl="0" algn="ctr"/>
-            <a:r>
-              <a:rPr lang="en" sz="900" b="1" dirty="0">
-                <a:solidFill>
-                  <a:schemeClr val="lt1"/>
-                </a:solidFill>
-                <a:latin typeface="Muli Light"/>
-                <a:ea typeface="Muli Light"/>
-                <a:cs typeface="Muli Light"/>
-                <a:sym typeface="Muli Light"/>
-              </a:rPr>
-              <a:t>4/10</a:t>
-            </a:r>
-          </a:p>
-        </p:txBody>
-      </p:sp>
-      <p:sp>
-        <p:nvSpPr>
-          <p:cNvPr id="78" name="Google Shape;190;p25">
-            <a:extLst>
-              <a:ext uri="{FF2B5EF4-FFF2-40B4-BE49-F238E27FC236}">
-                <a16:creationId xmlns:a16="http://schemas.microsoft.com/office/drawing/2014/main" id="{AEB98517-55D9-4830-8AAC-76C61EF7E530}"/>
-              </a:ext>
-            </a:extLst>
-          </p:cNvPr>
-          <p:cNvSpPr/>
-          <p:nvPr/>
-        </p:nvSpPr>
-        <p:spPr>
-          <a:xfrm>
-            <a:off x="3281146" y="1510003"/>
-            <a:ext cx="582300" cy="307500"/>
-          </a:xfrm>
-          <a:prstGeom prst="rect">
-            <a:avLst/>
-          </a:prstGeom>
-          <a:solidFill>
-            <a:srgbClr val="1155CC"/>
           </a:solidFill>
           <a:ln w="9525" cap="flat" cmpd="sng">
             <a:solidFill>
@@ -18225,10 +18170,10 @@
       </p:sp>
       <p:sp>
         <p:nvSpPr>
-          <p:cNvPr id="79" name="Google Shape;191;p25">
+          <p:cNvPr id="78" name="Google Shape;190;p25">
             <a:extLst>
               <a:ext uri="{FF2B5EF4-FFF2-40B4-BE49-F238E27FC236}">
-                <a16:creationId xmlns:a16="http://schemas.microsoft.com/office/drawing/2014/main" id="{ABA82969-FA7B-42E3-B968-3B3B5D1AF378}"/>
+                <a16:creationId xmlns:a16="http://schemas.microsoft.com/office/drawing/2014/main" id="{AEB98517-55D9-4830-8AAC-76C61EF7E530}"/>
               </a:ext>
             </a:extLst>
           </p:cNvPr>
@@ -18237,7 +18182,7 @@
         </p:nvSpPr>
         <p:spPr>
           <a:xfrm>
-            <a:off x="3864050" y="1510003"/>
+            <a:off x="3281146" y="1510003"/>
             <a:ext cx="582300" cy="307500"/>
           </a:xfrm>
           <a:prstGeom prst="rect">
@@ -18280,10 +18225,10 @@
       </p:sp>
       <p:sp>
         <p:nvSpPr>
-          <p:cNvPr id="80" name="Google Shape;192;p25">
+          <p:cNvPr id="79" name="Google Shape;191;p25">
             <a:extLst>
               <a:ext uri="{FF2B5EF4-FFF2-40B4-BE49-F238E27FC236}">
-                <a16:creationId xmlns:a16="http://schemas.microsoft.com/office/drawing/2014/main" id="{9F671708-A0CD-484D-84A3-D4FFCD63760B}"/>
+                <a16:creationId xmlns:a16="http://schemas.microsoft.com/office/drawing/2014/main" id="{ABA82969-FA7B-42E3-B968-3B3B5D1AF378}"/>
               </a:ext>
             </a:extLst>
           </p:cNvPr>
@@ -18292,7 +18237,7 @@
         </p:nvSpPr>
         <p:spPr>
           <a:xfrm>
-            <a:off x="4446954" y="1510003"/>
+            <a:off x="3864050" y="1510003"/>
             <a:ext cx="582300" cy="307500"/>
           </a:xfrm>
           <a:prstGeom prst="rect">
@@ -18335,10 +18280,10 @@
       </p:sp>
       <p:sp>
         <p:nvSpPr>
-          <p:cNvPr id="81" name="Google Shape;198;p25">
+          <p:cNvPr id="80" name="Google Shape;192;p25">
             <a:extLst>
               <a:ext uri="{FF2B5EF4-FFF2-40B4-BE49-F238E27FC236}">
-                <a16:creationId xmlns:a16="http://schemas.microsoft.com/office/drawing/2014/main" id="{8A042C75-B907-4374-9B2D-066605083D7A}"/>
+                <a16:creationId xmlns:a16="http://schemas.microsoft.com/office/drawing/2014/main" id="{9F671708-A0CD-484D-84A3-D4FFCD63760B}"/>
               </a:ext>
             </a:extLst>
           </p:cNvPr>
@@ -18347,14 +18292,14 @@
         </p:nvSpPr>
         <p:spPr>
           <a:xfrm>
-            <a:off x="5031331" y="1510003"/>
+            <a:off x="4446954" y="1510003"/>
             <a:ext cx="582300" cy="307500"/>
           </a:xfrm>
           <a:prstGeom prst="rect">
             <a:avLst/>
           </a:prstGeom>
           <a:solidFill>
-            <a:srgbClr val="3C78D8"/>
+            <a:srgbClr val="1155CC"/>
           </a:solidFill>
           <a:ln w="9525" cap="flat" cmpd="sng">
             <a:solidFill>
@@ -18390,10 +18335,10 @@
       </p:sp>
       <p:sp>
         <p:nvSpPr>
-          <p:cNvPr id="82" name="Google Shape;199;p25">
+          <p:cNvPr id="81" name="Google Shape;198;p25">
             <a:extLst>
               <a:ext uri="{FF2B5EF4-FFF2-40B4-BE49-F238E27FC236}">
-                <a16:creationId xmlns:a16="http://schemas.microsoft.com/office/drawing/2014/main" id="{B3EE4E8A-11FC-4083-AD45-6CF79DAA0FF3}"/>
+                <a16:creationId xmlns:a16="http://schemas.microsoft.com/office/drawing/2014/main" id="{8A042C75-B907-4374-9B2D-066605083D7A}"/>
               </a:ext>
             </a:extLst>
           </p:cNvPr>
@@ -18402,7 +18347,7 @@
         </p:nvSpPr>
         <p:spPr>
           <a:xfrm>
-            <a:off x="5614235" y="1510003"/>
+            <a:off x="5031331" y="1510003"/>
             <a:ext cx="582300" cy="307500"/>
           </a:xfrm>
           <a:prstGeom prst="rect">
@@ -18445,10 +18390,10 @@
       </p:sp>
       <p:sp>
         <p:nvSpPr>
-          <p:cNvPr id="83" name="Google Shape;200;p25">
+          <p:cNvPr id="82" name="Google Shape;199;p25">
             <a:extLst>
               <a:ext uri="{FF2B5EF4-FFF2-40B4-BE49-F238E27FC236}">
-                <a16:creationId xmlns:a16="http://schemas.microsoft.com/office/drawing/2014/main" id="{453BE026-78AE-40C3-B666-74CE43DA86BA}"/>
+                <a16:creationId xmlns:a16="http://schemas.microsoft.com/office/drawing/2014/main" id="{B3EE4E8A-11FC-4083-AD45-6CF79DAA0FF3}"/>
               </a:ext>
             </a:extLst>
           </p:cNvPr>
@@ -18457,7 +18402,7 @@
         </p:nvSpPr>
         <p:spPr>
           <a:xfrm>
-            <a:off x="6197139" y="1510003"/>
+            <a:off x="5614235" y="1510003"/>
             <a:ext cx="582300" cy="307500"/>
           </a:xfrm>
           <a:prstGeom prst="rect">
@@ -18500,10 +18445,10 @@
       </p:sp>
       <p:sp>
         <p:nvSpPr>
-          <p:cNvPr id="84" name="Google Shape;206;p25">
+          <p:cNvPr id="83" name="Google Shape;200;p25">
             <a:extLst>
               <a:ext uri="{FF2B5EF4-FFF2-40B4-BE49-F238E27FC236}">
-                <a16:creationId xmlns:a16="http://schemas.microsoft.com/office/drawing/2014/main" id="{6E6ECD1F-8A22-49A8-A840-A096728C7006}"/>
+                <a16:creationId xmlns:a16="http://schemas.microsoft.com/office/drawing/2014/main" id="{453BE026-78AE-40C3-B666-74CE43DA86BA}"/>
               </a:ext>
             </a:extLst>
           </p:cNvPr>
@@ -18512,14 +18457,14 @@
         </p:nvSpPr>
         <p:spPr>
           <a:xfrm>
-            <a:off x="6780502" y="1510003"/>
+            <a:off x="6197139" y="1510003"/>
             <a:ext cx="582300" cy="307500"/>
           </a:xfrm>
           <a:prstGeom prst="rect">
             <a:avLst/>
           </a:prstGeom>
           <a:solidFill>
-            <a:srgbClr val="6D9EEB"/>
+            <a:srgbClr val="3C78D8"/>
           </a:solidFill>
           <a:ln w="9525" cap="flat" cmpd="sng">
             <a:solidFill>
@@ -18555,10 +18500,10 @@
       </p:sp>
       <p:sp>
         <p:nvSpPr>
-          <p:cNvPr id="85" name="Google Shape;207;p25">
+          <p:cNvPr id="84" name="Google Shape;206;p25">
             <a:extLst>
               <a:ext uri="{FF2B5EF4-FFF2-40B4-BE49-F238E27FC236}">
-                <a16:creationId xmlns:a16="http://schemas.microsoft.com/office/drawing/2014/main" id="{9545008D-E4A0-423D-8DA7-DE515664F5FC}"/>
+                <a16:creationId xmlns:a16="http://schemas.microsoft.com/office/drawing/2014/main" id="{6E6ECD1F-8A22-49A8-A840-A096728C7006}"/>
               </a:ext>
             </a:extLst>
           </p:cNvPr>
@@ -18567,7 +18512,7 @@
         </p:nvSpPr>
         <p:spPr>
           <a:xfrm>
-            <a:off x="7363406" y="1510003"/>
+            <a:off x="6780502" y="1510003"/>
             <a:ext cx="582300" cy="307500"/>
           </a:xfrm>
           <a:prstGeom prst="rect">
@@ -18610,10 +18555,10 @@
       </p:sp>
       <p:sp>
         <p:nvSpPr>
-          <p:cNvPr id="86" name="Google Shape;208;p25">
+          <p:cNvPr id="85" name="Google Shape;207;p25">
             <a:extLst>
               <a:ext uri="{FF2B5EF4-FFF2-40B4-BE49-F238E27FC236}">
-                <a16:creationId xmlns:a16="http://schemas.microsoft.com/office/drawing/2014/main" id="{77C13BDC-0178-4A4C-BCF5-5DA6785367DC}"/>
+                <a16:creationId xmlns:a16="http://schemas.microsoft.com/office/drawing/2014/main" id="{9545008D-E4A0-423D-8DA7-DE515664F5FC}"/>
               </a:ext>
             </a:extLst>
           </p:cNvPr>
@@ -18622,7 +18567,7 @@
         </p:nvSpPr>
         <p:spPr>
           <a:xfrm>
-            <a:off x="7946310" y="1510003"/>
+            <a:off x="7363406" y="1510003"/>
             <a:ext cx="582300" cy="307500"/>
           </a:xfrm>
           <a:prstGeom prst="rect">
@@ -18647,15 +18592,7 @@
           </a:bodyPr>
           <a:lstStyle/>
           <a:p>
-            <a:pPr marL="0" lvl="0" indent="0" algn="ctr" rtl="0">
-              <a:spcBef>
-                <a:spcPts val="0"/>
-              </a:spcBef>
-              <a:spcAft>
-                <a:spcPts val="0"/>
-              </a:spcAft>
-              <a:buNone/>
-            </a:pPr>
+            <a:pPr lvl="0" algn="ctr"/>
             <a:r>
               <a:rPr lang="en" sz="900" b="1" dirty="0">
                 <a:solidFill>
@@ -18666,7 +18603,82 @@
                 <a:cs typeface="Muli Light"/>
                 <a:sym typeface="Muli Light"/>
               </a:rPr>
-              <a:t>13/10 -  15/10</a:t>
+              <a:t>13/10</a:t>
+            </a:r>
+          </a:p>
+        </p:txBody>
+      </p:sp>
+      <p:sp>
+        <p:nvSpPr>
+          <p:cNvPr id="86" name="Google Shape;208;p25">
+            <a:extLst>
+              <a:ext uri="{FF2B5EF4-FFF2-40B4-BE49-F238E27FC236}">
+                <a16:creationId xmlns:a16="http://schemas.microsoft.com/office/drawing/2014/main" id="{77C13BDC-0178-4A4C-BCF5-5DA6785367DC}"/>
+              </a:ext>
+            </a:extLst>
+          </p:cNvPr>
+          <p:cNvSpPr/>
+          <p:nvPr/>
+        </p:nvSpPr>
+        <p:spPr>
+          <a:xfrm>
+            <a:off x="7946310" y="1510003"/>
+            <a:ext cx="582300" cy="307500"/>
+          </a:xfrm>
+          <a:prstGeom prst="rect">
+            <a:avLst/>
+          </a:prstGeom>
+          <a:solidFill>
+            <a:srgbClr val="6D9EEB"/>
+          </a:solidFill>
+          <a:ln w="9525" cap="flat" cmpd="sng">
+            <a:solidFill>
+              <a:srgbClr val="FFFFFF"/>
+            </a:solidFill>
+            <a:prstDash val="solid"/>
+            <a:round/>
+            <a:headEnd type="none" w="sm" len="sm"/>
+            <a:tailEnd type="none" w="sm" len="sm"/>
+          </a:ln>
+        </p:spPr>
+        <p:txBody>
+          <a:bodyPr spcFirstLastPara="1" wrap="square" lIns="91425" tIns="91425" rIns="91425" bIns="91425" anchor="ctr" anchorCtr="0">
+            <a:noAutofit/>
+          </a:bodyPr>
+          <a:lstStyle/>
+          <a:p>
+            <a:pPr marL="0" lvl="0" indent="0" algn="ctr" rtl="0">
+              <a:spcBef>
+                <a:spcPts val="0"/>
+              </a:spcBef>
+              <a:spcAft>
+                <a:spcPts val="0"/>
+              </a:spcAft>
+              <a:buNone/>
+            </a:pPr>
+            <a:r>
+              <a:rPr lang="en" sz="900" b="1">
+                <a:solidFill>
+                  <a:schemeClr val="lt1"/>
+                </a:solidFill>
+                <a:latin typeface="Muli Light"/>
+                <a:ea typeface="Muli Light"/>
+                <a:cs typeface="Muli Light"/>
+                <a:sym typeface="Muli Light"/>
+              </a:rPr>
+              <a:t>14/10 </a:t>
+            </a:r>
+            <a:r>
+              <a:rPr lang="en" sz="900" b="1" dirty="0">
+                <a:solidFill>
+                  <a:schemeClr val="lt1"/>
+                </a:solidFill>
+                <a:latin typeface="Muli Light"/>
+                <a:ea typeface="Muli Light"/>
+                <a:cs typeface="Muli Light"/>
+                <a:sym typeface="Muli Light"/>
+              </a:rPr>
+              <a:t>-  15/10</a:t>
             </a:r>
             <a:endParaRPr sz="900" b="1" dirty="0">
               <a:solidFill>

</xml_diff>